<commit_message>
commited at 2020-05-04 09:29:40.778301
</commit_message>
<xml_diff>
--- a/Presentations/COVID-19 02-05-2020.pptx
+++ b/Presentations/COVID-19 02-05-2020.pptx
@@ -11,35 +11,6 @@
     <p:sldId id="259" r:id="rId10"/>
     <p:sldId id="260" r:id="rId11"/>
     <p:sldId id="261" r:id="rId12"/>
-    <p:sldId id="262" r:id="rId13"/>
-    <p:sldId id="263" r:id="rId14"/>
-    <p:sldId id="264" r:id="rId15"/>
-    <p:sldId id="265" r:id="rId16"/>
-    <p:sldId id="266" r:id="rId17"/>
-    <p:sldId id="267" r:id="rId18"/>
-    <p:sldId id="268" r:id="rId19"/>
-    <p:sldId id="269" r:id="rId20"/>
-    <p:sldId id="270" r:id="rId21"/>
-    <p:sldId id="271" r:id="rId22"/>
-    <p:sldId id="272" r:id="rId23"/>
-    <p:sldId id="273" r:id="rId24"/>
-    <p:sldId id="274" r:id="rId25"/>
-    <p:sldId id="275" r:id="rId26"/>
-    <p:sldId id="276" r:id="rId27"/>
-    <p:sldId id="277" r:id="rId28"/>
-    <p:sldId id="278" r:id="rId29"/>
-    <p:sldId id="279" r:id="rId30"/>
-    <p:sldId id="280" r:id="rId31"/>
-    <p:sldId id="281" r:id="rId32"/>
-    <p:sldId id="282" r:id="rId33"/>
-    <p:sldId id="283" r:id="rId34"/>
-    <p:sldId id="284" r:id="rId35"/>
-    <p:sldId id="285" r:id="rId36"/>
-    <p:sldId id="286" r:id="rId37"/>
-    <p:sldId id="287" r:id="rId38"/>
-    <p:sldId id="288" r:id="rId39"/>
-    <p:sldId id="289" r:id="rId40"/>
-    <p:sldId id="290" r:id="rId41"/>
   </p:sldIdLst>
   <p:sldSz cx="9144000" cy="6858000" type="screen4x3"/>
   <p:notesSz cx="6858000" cy="9144000"/>
@@ -3172,766 +3143,6 @@
 </p:sld>
 </file>
 
-<file path=ppt/slides/slide10.xml><?xml version="1.0" encoding="utf-8"?>
-<p:sld xmlns:a="http://schemas.openxmlformats.org/drawingml/2006/main" xmlns:p="http://schemas.openxmlformats.org/presentationml/2006/main" xmlns:r="http://schemas.openxmlformats.org/officeDocument/2006/relationships">
-  <p:cSld>
-    <p:spTree>
-      <p:nvGrpSpPr>
-        <p:cNvPr id="1" name=""/>
-        <p:cNvGrpSpPr/>
-        <p:nvPr/>
-      </p:nvGrpSpPr>
-      <p:grpSpPr/>
-      <p:sp>
-        <p:nvSpPr>
-          <p:cNvPr id="2" name="Title 1"/>
-          <p:cNvSpPr>
-            <a:spLocks noGrp="1"/>
-          </p:cNvSpPr>
-          <p:nvPr>
-            <p:ph type="title"/>
-          </p:nvPr>
-        </p:nvSpPr>
-        <p:spPr/>
-        <p:txBody>
-          <a:bodyPr/>
-          <a:lstStyle/>
-          <a:p/>
-        </p:txBody>
-      </p:sp>
-      <p:sp>
-        <p:nvSpPr>
-          <p:cNvPr id="4" name="Text Placeholder 3"/>
-          <p:cNvSpPr>
-            <a:spLocks noGrp="1"/>
-          </p:cNvSpPr>
-          <p:nvPr>
-            <p:ph type="body" idx="2" sz="half"/>
-          </p:nvPr>
-        </p:nvSpPr>
-        <p:spPr/>
-        <p:txBody>
-          <a:bodyPr/>
-          <a:lstStyle/>
-          <a:p/>
-        </p:txBody>
-      </p:sp>
-      <p:pic>
-        <p:nvPicPr>
-          <p:cNvPr id="5" name="Picture 4" descr="image.png"/>
-          <p:cNvPicPr>
-            <a:picLocks noChangeAspect="1"/>
-          </p:cNvPicPr>
-          <p:nvPr/>
-        </p:nvPicPr>
-        <p:blipFill>
-          <a:blip r:embed="rId2"/>
-          <a:stretch>
-            <a:fillRect/>
-          </a:stretch>
-        </p:blipFill>
-        <p:spPr>
-          <a:xfrm>
-            <a:off x="457200" y="1600200"/>
-            <a:ext cx="8229600" cy="3657600"/>
-          </a:xfrm>
-          <a:prstGeom prst="rect">
-            <a:avLst/>
-          </a:prstGeom>
-        </p:spPr>
-      </p:pic>
-    </p:spTree>
-  </p:cSld>
-  <p:clrMapOvr>
-    <a:masterClrMapping/>
-  </p:clrMapOvr>
-</p:sld>
-</file>
-
-<file path=ppt/slides/slide11.xml><?xml version="1.0" encoding="utf-8"?>
-<p:sld xmlns:a="http://schemas.openxmlformats.org/drawingml/2006/main" xmlns:p="http://schemas.openxmlformats.org/presentationml/2006/main" xmlns:r="http://schemas.openxmlformats.org/officeDocument/2006/relationships">
-  <p:cSld>
-    <p:spTree>
-      <p:nvGrpSpPr>
-        <p:cNvPr id="1" name=""/>
-        <p:cNvGrpSpPr/>
-        <p:nvPr/>
-      </p:nvGrpSpPr>
-      <p:grpSpPr/>
-      <p:sp>
-        <p:nvSpPr>
-          <p:cNvPr id="2" name="Title 1"/>
-          <p:cNvSpPr>
-            <a:spLocks noGrp="1"/>
-          </p:cNvSpPr>
-          <p:nvPr>
-            <p:ph type="title"/>
-          </p:nvPr>
-        </p:nvSpPr>
-        <p:spPr/>
-        <p:txBody>
-          <a:bodyPr/>
-          <a:lstStyle/>
-          <a:p/>
-        </p:txBody>
-      </p:sp>
-      <p:sp>
-        <p:nvSpPr>
-          <p:cNvPr id="4" name="Text Placeholder 3"/>
-          <p:cNvSpPr>
-            <a:spLocks noGrp="1"/>
-          </p:cNvSpPr>
-          <p:nvPr>
-            <p:ph type="body" idx="2" sz="half"/>
-          </p:nvPr>
-        </p:nvSpPr>
-        <p:spPr/>
-        <p:txBody>
-          <a:bodyPr/>
-          <a:lstStyle/>
-          <a:p/>
-        </p:txBody>
-      </p:sp>
-      <p:pic>
-        <p:nvPicPr>
-          <p:cNvPr id="5" name="Picture 4" descr="image.png"/>
-          <p:cNvPicPr>
-            <a:picLocks noChangeAspect="1"/>
-          </p:cNvPicPr>
-          <p:nvPr/>
-        </p:nvPicPr>
-        <p:blipFill>
-          <a:blip r:embed="rId2"/>
-          <a:stretch>
-            <a:fillRect/>
-          </a:stretch>
-        </p:blipFill>
-        <p:spPr>
-          <a:xfrm>
-            <a:off x="457200" y="685800"/>
-            <a:ext cx="8229600" cy="5486400"/>
-          </a:xfrm>
-          <a:prstGeom prst="rect">
-            <a:avLst/>
-          </a:prstGeom>
-        </p:spPr>
-      </p:pic>
-    </p:spTree>
-  </p:cSld>
-  <p:clrMapOvr>
-    <a:masterClrMapping/>
-  </p:clrMapOvr>
-</p:sld>
-</file>
-
-<file path=ppt/slides/slide12.xml><?xml version="1.0" encoding="utf-8"?>
-<p:sld xmlns:a="http://schemas.openxmlformats.org/drawingml/2006/main" xmlns:p="http://schemas.openxmlformats.org/presentationml/2006/main" xmlns:r="http://schemas.openxmlformats.org/officeDocument/2006/relationships">
-  <p:cSld>
-    <p:spTree>
-      <p:nvGrpSpPr>
-        <p:cNvPr id="1" name=""/>
-        <p:cNvGrpSpPr/>
-        <p:nvPr/>
-      </p:nvGrpSpPr>
-      <p:grpSpPr/>
-      <p:sp>
-        <p:nvSpPr>
-          <p:cNvPr id="2" name="Title 1"/>
-          <p:cNvSpPr>
-            <a:spLocks noGrp="1"/>
-          </p:cNvSpPr>
-          <p:nvPr>
-            <p:ph type="title"/>
-          </p:nvPr>
-        </p:nvSpPr>
-        <p:spPr/>
-        <p:txBody>
-          <a:bodyPr/>
-          <a:lstStyle/>
-          <a:p/>
-        </p:txBody>
-      </p:sp>
-      <p:sp>
-        <p:nvSpPr>
-          <p:cNvPr id="4" name="Text Placeholder 3"/>
-          <p:cNvSpPr>
-            <a:spLocks noGrp="1"/>
-          </p:cNvSpPr>
-          <p:nvPr>
-            <p:ph type="body" idx="2" sz="half"/>
-          </p:nvPr>
-        </p:nvSpPr>
-        <p:spPr/>
-        <p:txBody>
-          <a:bodyPr/>
-          <a:lstStyle/>
-          <a:p/>
-        </p:txBody>
-      </p:sp>
-      <p:pic>
-        <p:nvPicPr>
-          <p:cNvPr id="5" name="Picture 4" descr="image.png"/>
-          <p:cNvPicPr>
-            <a:picLocks noChangeAspect="1"/>
-          </p:cNvPicPr>
-          <p:nvPr/>
-        </p:nvPicPr>
-        <p:blipFill>
-          <a:blip r:embed="rId2"/>
-          <a:stretch>
-            <a:fillRect/>
-          </a:stretch>
-        </p:blipFill>
-        <p:spPr>
-          <a:xfrm>
-            <a:off x="457200" y="685800"/>
-            <a:ext cx="8229600" cy="5486400"/>
-          </a:xfrm>
-          <a:prstGeom prst="rect">
-            <a:avLst/>
-          </a:prstGeom>
-        </p:spPr>
-      </p:pic>
-    </p:spTree>
-  </p:cSld>
-  <p:clrMapOvr>
-    <a:masterClrMapping/>
-  </p:clrMapOvr>
-</p:sld>
-</file>
-
-<file path=ppt/slides/slide13.xml><?xml version="1.0" encoding="utf-8"?>
-<p:sld xmlns:a="http://schemas.openxmlformats.org/drawingml/2006/main" xmlns:p="http://schemas.openxmlformats.org/presentationml/2006/main" xmlns:r="http://schemas.openxmlformats.org/officeDocument/2006/relationships">
-  <p:cSld>
-    <p:spTree>
-      <p:nvGrpSpPr>
-        <p:cNvPr id="1" name=""/>
-        <p:cNvGrpSpPr/>
-        <p:nvPr/>
-      </p:nvGrpSpPr>
-      <p:grpSpPr/>
-      <p:sp>
-        <p:nvSpPr>
-          <p:cNvPr id="2" name="Title 1"/>
-          <p:cNvSpPr>
-            <a:spLocks noGrp="1"/>
-          </p:cNvSpPr>
-          <p:nvPr>
-            <p:ph type="title"/>
-          </p:nvPr>
-        </p:nvSpPr>
-        <p:spPr/>
-        <p:txBody>
-          <a:bodyPr/>
-          <a:lstStyle/>
-          <a:p/>
-        </p:txBody>
-      </p:sp>
-      <p:sp>
-        <p:nvSpPr>
-          <p:cNvPr id="4" name="Text Placeholder 3"/>
-          <p:cNvSpPr>
-            <a:spLocks noGrp="1"/>
-          </p:cNvSpPr>
-          <p:nvPr>
-            <p:ph type="body" idx="2" sz="half"/>
-          </p:nvPr>
-        </p:nvSpPr>
-        <p:spPr/>
-        <p:txBody>
-          <a:bodyPr/>
-          <a:lstStyle/>
-          <a:p/>
-        </p:txBody>
-      </p:sp>
-      <p:pic>
-        <p:nvPicPr>
-          <p:cNvPr id="5" name="Picture 4" descr="image.png"/>
-          <p:cNvPicPr>
-            <a:picLocks noChangeAspect="1"/>
-          </p:cNvPicPr>
-          <p:nvPr/>
-        </p:nvPicPr>
-        <p:blipFill>
-          <a:blip r:embed="rId2"/>
-          <a:stretch>
-            <a:fillRect/>
-          </a:stretch>
-        </p:blipFill>
-        <p:spPr>
-          <a:xfrm>
-            <a:off x="457200" y="685800"/>
-            <a:ext cx="8229600" cy="5486400"/>
-          </a:xfrm>
-          <a:prstGeom prst="rect">
-            <a:avLst/>
-          </a:prstGeom>
-        </p:spPr>
-      </p:pic>
-    </p:spTree>
-  </p:cSld>
-  <p:clrMapOvr>
-    <a:masterClrMapping/>
-  </p:clrMapOvr>
-</p:sld>
-</file>
-
-<file path=ppt/slides/slide14.xml><?xml version="1.0" encoding="utf-8"?>
-<p:sld xmlns:a="http://schemas.openxmlformats.org/drawingml/2006/main" xmlns:p="http://schemas.openxmlformats.org/presentationml/2006/main" xmlns:r="http://schemas.openxmlformats.org/officeDocument/2006/relationships">
-  <p:cSld>
-    <p:spTree>
-      <p:nvGrpSpPr>
-        <p:cNvPr id="1" name=""/>
-        <p:cNvGrpSpPr/>
-        <p:nvPr/>
-      </p:nvGrpSpPr>
-      <p:grpSpPr/>
-      <p:sp>
-        <p:nvSpPr>
-          <p:cNvPr id="2" name="Title 1"/>
-          <p:cNvSpPr>
-            <a:spLocks noGrp="1"/>
-          </p:cNvSpPr>
-          <p:nvPr>
-            <p:ph type="title"/>
-          </p:nvPr>
-        </p:nvSpPr>
-        <p:spPr/>
-        <p:txBody>
-          <a:bodyPr/>
-          <a:lstStyle/>
-          <a:p/>
-        </p:txBody>
-      </p:sp>
-      <p:sp>
-        <p:nvSpPr>
-          <p:cNvPr id="4" name="Text Placeholder 3"/>
-          <p:cNvSpPr>
-            <a:spLocks noGrp="1"/>
-          </p:cNvSpPr>
-          <p:nvPr>
-            <p:ph type="body" idx="2" sz="half"/>
-          </p:nvPr>
-        </p:nvSpPr>
-        <p:spPr/>
-        <p:txBody>
-          <a:bodyPr/>
-          <a:lstStyle/>
-          <a:p/>
-        </p:txBody>
-      </p:sp>
-      <p:pic>
-        <p:nvPicPr>
-          <p:cNvPr id="5" name="Picture 4" descr="image.png"/>
-          <p:cNvPicPr>
-            <a:picLocks noChangeAspect="1"/>
-          </p:cNvPicPr>
-          <p:nvPr/>
-        </p:nvPicPr>
-        <p:blipFill>
-          <a:blip r:embed="rId2"/>
-          <a:stretch>
-            <a:fillRect/>
-          </a:stretch>
-        </p:blipFill>
-        <p:spPr>
-          <a:xfrm>
-            <a:off x="457200" y="685800"/>
-            <a:ext cx="8229600" cy="5486400"/>
-          </a:xfrm>
-          <a:prstGeom prst="rect">
-            <a:avLst/>
-          </a:prstGeom>
-        </p:spPr>
-      </p:pic>
-    </p:spTree>
-  </p:cSld>
-  <p:clrMapOvr>
-    <a:masterClrMapping/>
-  </p:clrMapOvr>
-</p:sld>
-</file>
-
-<file path=ppt/slides/slide15.xml><?xml version="1.0" encoding="utf-8"?>
-<p:sld xmlns:a="http://schemas.openxmlformats.org/drawingml/2006/main" xmlns:p="http://schemas.openxmlformats.org/presentationml/2006/main" xmlns:r="http://schemas.openxmlformats.org/officeDocument/2006/relationships">
-  <p:cSld>
-    <p:spTree>
-      <p:nvGrpSpPr>
-        <p:cNvPr id="1" name=""/>
-        <p:cNvGrpSpPr/>
-        <p:nvPr/>
-      </p:nvGrpSpPr>
-      <p:grpSpPr/>
-      <p:sp>
-        <p:nvSpPr>
-          <p:cNvPr id="2" name="Title 1"/>
-          <p:cNvSpPr>
-            <a:spLocks noGrp="1"/>
-          </p:cNvSpPr>
-          <p:nvPr>
-            <p:ph type="title"/>
-          </p:nvPr>
-        </p:nvSpPr>
-        <p:spPr/>
-        <p:txBody>
-          <a:bodyPr/>
-          <a:lstStyle/>
-          <a:p/>
-        </p:txBody>
-      </p:sp>
-      <p:sp>
-        <p:nvSpPr>
-          <p:cNvPr id="4" name="Text Placeholder 3"/>
-          <p:cNvSpPr>
-            <a:spLocks noGrp="1"/>
-          </p:cNvSpPr>
-          <p:nvPr>
-            <p:ph type="body" idx="2" sz="half"/>
-          </p:nvPr>
-        </p:nvSpPr>
-        <p:spPr/>
-        <p:txBody>
-          <a:bodyPr/>
-          <a:lstStyle/>
-          <a:p/>
-        </p:txBody>
-      </p:sp>
-      <p:pic>
-        <p:nvPicPr>
-          <p:cNvPr id="5" name="Picture 4" descr="image.png"/>
-          <p:cNvPicPr>
-            <a:picLocks noChangeAspect="1"/>
-          </p:cNvPicPr>
-          <p:nvPr/>
-        </p:nvPicPr>
-        <p:blipFill>
-          <a:blip r:embed="rId2"/>
-          <a:stretch>
-            <a:fillRect/>
-          </a:stretch>
-        </p:blipFill>
-        <p:spPr>
-          <a:xfrm>
-            <a:off x="457200" y="685800"/>
-            <a:ext cx="8229600" cy="5486400"/>
-          </a:xfrm>
-          <a:prstGeom prst="rect">
-            <a:avLst/>
-          </a:prstGeom>
-        </p:spPr>
-      </p:pic>
-    </p:spTree>
-  </p:cSld>
-  <p:clrMapOvr>
-    <a:masterClrMapping/>
-  </p:clrMapOvr>
-</p:sld>
-</file>
-
-<file path=ppt/slides/slide16.xml><?xml version="1.0" encoding="utf-8"?>
-<p:sld xmlns:a="http://schemas.openxmlformats.org/drawingml/2006/main" xmlns:p="http://schemas.openxmlformats.org/presentationml/2006/main" xmlns:r="http://schemas.openxmlformats.org/officeDocument/2006/relationships">
-  <p:cSld>
-    <p:spTree>
-      <p:nvGrpSpPr>
-        <p:cNvPr id="1" name=""/>
-        <p:cNvGrpSpPr/>
-        <p:nvPr/>
-      </p:nvGrpSpPr>
-      <p:grpSpPr/>
-      <p:sp>
-        <p:nvSpPr>
-          <p:cNvPr id="2" name="Title 1"/>
-          <p:cNvSpPr>
-            <a:spLocks noGrp="1"/>
-          </p:cNvSpPr>
-          <p:nvPr>
-            <p:ph type="title"/>
-          </p:nvPr>
-        </p:nvSpPr>
-        <p:spPr/>
-        <p:txBody>
-          <a:bodyPr/>
-          <a:lstStyle/>
-          <a:p/>
-        </p:txBody>
-      </p:sp>
-      <p:sp>
-        <p:nvSpPr>
-          <p:cNvPr id="4" name="Text Placeholder 3"/>
-          <p:cNvSpPr>
-            <a:spLocks noGrp="1"/>
-          </p:cNvSpPr>
-          <p:nvPr>
-            <p:ph type="body" idx="2" sz="half"/>
-          </p:nvPr>
-        </p:nvSpPr>
-        <p:spPr/>
-        <p:txBody>
-          <a:bodyPr/>
-          <a:lstStyle/>
-          <a:p/>
-        </p:txBody>
-      </p:sp>
-      <p:pic>
-        <p:nvPicPr>
-          <p:cNvPr id="5" name="Picture 4" descr="image.png"/>
-          <p:cNvPicPr>
-            <a:picLocks noChangeAspect="1"/>
-          </p:cNvPicPr>
-          <p:nvPr/>
-        </p:nvPicPr>
-        <p:blipFill>
-          <a:blip r:embed="rId2"/>
-          <a:stretch>
-            <a:fillRect/>
-          </a:stretch>
-        </p:blipFill>
-        <p:spPr>
-          <a:xfrm>
-            <a:off x="457200" y="685800"/>
-            <a:ext cx="8229600" cy="5486400"/>
-          </a:xfrm>
-          <a:prstGeom prst="rect">
-            <a:avLst/>
-          </a:prstGeom>
-        </p:spPr>
-      </p:pic>
-    </p:spTree>
-  </p:cSld>
-  <p:clrMapOvr>
-    <a:masterClrMapping/>
-  </p:clrMapOvr>
-</p:sld>
-</file>
-
-<file path=ppt/slides/slide17.xml><?xml version="1.0" encoding="utf-8"?>
-<p:sld xmlns:a="http://schemas.openxmlformats.org/drawingml/2006/main" xmlns:p="http://schemas.openxmlformats.org/presentationml/2006/main" xmlns:r="http://schemas.openxmlformats.org/officeDocument/2006/relationships">
-  <p:cSld>
-    <p:spTree>
-      <p:nvGrpSpPr>
-        <p:cNvPr id="1" name=""/>
-        <p:cNvGrpSpPr/>
-        <p:nvPr/>
-      </p:nvGrpSpPr>
-      <p:grpSpPr/>
-      <p:sp>
-        <p:nvSpPr>
-          <p:cNvPr id="2" name="Title 1"/>
-          <p:cNvSpPr>
-            <a:spLocks noGrp="1"/>
-          </p:cNvSpPr>
-          <p:nvPr>
-            <p:ph type="title"/>
-          </p:nvPr>
-        </p:nvSpPr>
-        <p:spPr/>
-        <p:txBody>
-          <a:bodyPr/>
-          <a:lstStyle/>
-          <a:p/>
-        </p:txBody>
-      </p:sp>
-      <p:sp>
-        <p:nvSpPr>
-          <p:cNvPr id="4" name="Text Placeholder 3"/>
-          <p:cNvSpPr>
-            <a:spLocks noGrp="1"/>
-          </p:cNvSpPr>
-          <p:nvPr>
-            <p:ph type="body" idx="2" sz="half"/>
-          </p:nvPr>
-        </p:nvSpPr>
-        <p:spPr/>
-        <p:txBody>
-          <a:bodyPr/>
-          <a:lstStyle/>
-          <a:p/>
-        </p:txBody>
-      </p:sp>
-      <p:pic>
-        <p:nvPicPr>
-          <p:cNvPr id="5" name="Picture 4" descr="image.png"/>
-          <p:cNvPicPr>
-            <a:picLocks noChangeAspect="1"/>
-          </p:cNvPicPr>
-          <p:nvPr/>
-        </p:nvPicPr>
-        <p:blipFill>
-          <a:blip r:embed="rId2"/>
-          <a:stretch>
-            <a:fillRect/>
-          </a:stretch>
-        </p:blipFill>
-        <p:spPr>
-          <a:xfrm>
-            <a:off x="457200" y="685800"/>
-            <a:ext cx="8229600" cy="5486400"/>
-          </a:xfrm>
-          <a:prstGeom prst="rect">
-            <a:avLst/>
-          </a:prstGeom>
-        </p:spPr>
-      </p:pic>
-    </p:spTree>
-  </p:cSld>
-  <p:clrMapOvr>
-    <a:masterClrMapping/>
-  </p:clrMapOvr>
-</p:sld>
-</file>
-
-<file path=ppt/slides/slide18.xml><?xml version="1.0" encoding="utf-8"?>
-<p:sld xmlns:a="http://schemas.openxmlformats.org/drawingml/2006/main" xmlns:p="http://schemas.openxmlformats.org/presentationml/2006/main" xmlns:r="http://schemas.openxmlformats.org/officeDocument/2006/relationships">
-  <p:cSld>
-    <p:spTree>
-      <p:nvGrpSpPr>
-        <p:cNvPr id="1" name=""/>
-        <p:cNvGrpSpPr/>
-        <p:nvPr/>
-      </p:nvGrpSpPr>
-      <p:grpSpPr/>
-      <p:sp>
-        <p:nvSpPr>
-          <p:cNvPr id="2" name="Title 1"/>
-          <p:cNvSpPr>
-            <a:spLocks noGrp="1"/>
-          </p:cNvSpPr>
-          <p:nvPr>
-            <p:ph type="title"/>
-          </p:nvPr>
-        </p:nvSpPr>
-        <p:spPr/>
-        <p:txBody>
-          <a:bodyPr/>
-          <a:lstStyle/>
-          <a:p/>
-        </p:txBody>
-      </p:sp>
-      <p:sp>
-        <p:nvSpPr>
-          <p:cNvPr id="4" name="Text Placeholder 3"/>
-          <p:cNvSpPr>
-            <a:spLocks noGrp="1"/>
-          </p:cNvSpPr>
-          <p:nvPr>
-            <p:ph type="body" idx="2" sz="half"/>
-          </p:nvPr>
-        </p:nvSpPr>
-        <p:spPr/>
-        <p:txBody>
-          <a:bodyPr/>
-          <a:lstStyle/>
-          <a:p/>
-        </p:txBody>
-      </p:sp>
-      <p:pic>
-        <p:nvPicPr>
-          <p:cNvPr id="5" name="Picture 4" descr="image.png"/>
-          <p:cNvPicPr>
-            <a:picLocks noChangeAspect="1"/>
-          </p:cNvPicPr>
-          <p:nvPr/>
-        </p:nvPicPr>
-        <p:blipFill>
-          <a:blip r:embed="rId2"/>
-          <a:stretch>
-            <a:fillRect/>
-          </a:stretch>
-        </p:blipFill>
-        <p:spPr>
-          <a:xfrm>
-            <a:off x="457200" y="685800"/>
-            <a:ext cx="8229600" cy="5486400"/>
-          </a:xfrm>
-          <a:prstGeom prst="rect">
-            <a:avLst/>
-          </a:prstGeom>
-        </p:spPr>
-      </p:pic>
-    </p:spTree>
-  </p:cSld>
-  <p:clrMapOvr>
-    <a:masterClrMapping/>
-  </p:clrMapOvr>
-</p:sld>
-</file>
-
-<file path=ppt/slides/slide19.xml><?xml version="1.0" encoding="utf-8"?>
-<p:sld xmlns:a="http://schemas.openxmlformats.org/drawingml/2006/main" xmlns:p="http://schemas.openxmlformats.org/presentationml/2006/main" xmlns:r="http://schemas.openxmlformats.org/officeDocument/2006/relationships">
-  <p:cSld>
-    <p:spTree>
-      <p:nvGrpSpPr>
-        <p:cNvPr id="1" name=""/>
-        <p:cNvGrpSpPr/>
-        <p:nvPr/>
-      </p:nvGrpSpPr>
-      <p:grpSpPr/>
-      <p:sp>
-        <p:nvSpPr>
-          <p:cNvPr id="2" name="Title 1"/>
-          <p:cNvSpPr>
-            <a:spLocks noGrp="1"/>
-          </p:cNvSpPr>
-          <p:nvPr>
-            <p:ph type="title"/>
-          </p:nvPr>
-        </p:nvSpPr>
-        <p:spPr/>
-        <p:txBody>
-          <a:bodyPr/>
-          <a:lstStyle/>
-          <a:p/>
-        </p:txBody>
-      </p:sp>
-      <p:sp>
-        <p:nvSpPr>
-          <p:cNvPr id="4" name="Text Placeholder 3"/>
-          <p:cNvSpPr>
-            <a:spLocks noGrp="1"/>
-          </p:cNvSpPr>
-          <p:nvPr>
-            <p:ph type="body" idx="2" sz="half"/>
-          </p:nvPr>
-        </p:nvSpPr>
-        <p:spPr/>
-        <p:txBody>
-          <a:bodyPr/>
-          <a:lstStyle/>
-          <a:p/>
-        </p:txBody>
-      </p:sp>
-      <p:pic>
-        <p:nvPicPr>
-          <p:cNvPr id="5" name="Picture 4" descr="image.png"/>
-          <p:cNvPicPr>
-            <a:picLocks noChangeAspect="1"/>
-          </p:cNvPicPr>
-          <p:nvPr/>
-        </p:nvPicPr>
-        <p:blipFill>
-          <a:blip r:embed="rId2"/>
-          <a:stretch>
-            <a:fillRect/>
-          </a:stretch>
-        </p:blipFill>
-        <p:spPr>
-          <a:xfrm>
-            <a:off x="457200" y="685800"/>
-            <a:ext cx="8229600" cy="5486400"/>
-          </a:xfrm>
-          <a:prstGeom prst="rect">
-            <a:avLst/>
-          </a:prstGeom>
-        </p:spPr>
-      </p:pic>
-    </p:spTree>
-  </p:cSld>
-  <p:clrMapOvr>
-    <a:masterClrMapping/>
-  </p:clrMapOvr>
-</p:sld>
-</file>
-
 <file path=ppt/slides/slide2.xml><?xml version="1.0" encoding="utf-8"?>
 <p:sld xmlns:a="http://schemas.openxmlformats.org/drawingml/2006/main" xmlns:p="http://schemas.openxmlformats.org/presentationml/2006/main" xmlns:r="http://schemas.openxmlformats.org/officeDocument/2006/relationships">
   <p:cSld>
@@ -4073,766 +3284,6 @@
           </a:p>
         </p:txBody>
       </p:sp>
-    </p:spTree>
-  </p:cSld>
-  <p:clrMapOvr>
-    <a:masterClrMapping/>
-  </p:clrMapOvr>
-</p:sld>
-</file>
-
-<file path=ppt/slides/slide20.xml><?xml version="1.0" encoding="utf-8"?>
-<p:sld xmlns:a="http://schemas.openxmlformats.org/drawingml/2006/main" xmlns:p="http://schemas.openxmlformats.org/presentationml/2006/main" xmlns:r="http://schemas.openxmlformats.org/officeDocument/2006/relationships">
-  <p:cSld>
-    <p:spTree>
-      <p:nvGrpSpPr>
-        <p:cNvPr id="1" name=""/>
-        <p:cNvGrpSpPr/>
-        <p:nvPr/>
-      </p:nvGrpSpPr>
-      <p:grpSpPr/>
-      <p:sp>
-        <p:nvSpPr>
-          <p:cNvPr id="2" name="Title 1"/>
-          <p:cNvSpPr>
-            <a:spLocks noGrp="1"/>
-          </p:cNvSpPr>
-          <p:nvPr>
-            <p:ph type="title"/>
-          </p:nvPr>
-        </p:nvSpPr>
-        <p:spPr/>
-        <p:txBody>
-          <a:bodyPr/>
-          <a:lstStyle/>
-          <a:p/>
-        </p:txBody>
-      </p:sp>
-      <p:sp>
-        <p:nvSpPr>
-          <p:cNvPr id="4" name="Text Placeholder 3"/>
-          <p:cNvSpPr>
-            <a:spLocks noGrp="1"/>
-          </p:cNvSpPr>
-          <p:nvPr>
-            <p:ph type="body" idx="2" sz="half"/>
-          </p:nvPr>
-        </p:nvSpPr>
-        <p:spPr/>
-        <p:txBody>
-          <a:bodyPr/>
-          <a:lstStyle/>
-          <a:p/>
-        </p:txBody>
-      </p:sp>
-      <p:pic>
-        <p:nvPicPr>
-          <p:cNvPr id="5" name="Picture 4" descr="image.png"/>
-          <p:cNvPicPr>
-            <a:picLocks noChangeAspect="1"/>
-          </p:cNvPicPr>
-          <p:nvPr/>
-        </p:nvPicPr>
-        <p:blipFill>
-          <a:blip r:embed="rId2"/>
-          <a:stretch>
-            <a:fillRect/>
-          </a:stretch>
-        </p:blipFill>
-        <p:spPr>
-          <a:xfrm>
-            <a:off x="457200" y="685800"/>
-            <a:ext cx="8229600" cy="5486400"/>
-          </a:xfrm>
-          <a:prstGeom prst="rect">
-            <a:avLst/>
-          </a:prstGeom>
-        </p:spPr>
-      </p:pic>
-    </p:spTree>
-  </p:cSld>
-  <p:clrMapOvr>
-    <a:masterClrMapping/>
-  </p:clrMapOvr>
-</p:sld>
-</file>
-
-<file path=ppt/slides/slide21.xml><?xml version="1.0" encoding="utf-8"?>
-<p:sld xmlns:a="http://schemas.openxmlformats.org/drawingml/2006/main" xmlns:p="http://schemas.openxmlformats.org/presentationml/2006/main" xmlns:r="http://schemas.openxmlformats.org/officeDocument/2006/relationships">
-  <p:cSld>
-    <p:spTree>
-      <p:nvGrpSpPr>
-        <p:cNvPr id="1" name=""/>
-        <p:cNvGrpSpPr/>
-        <p:nvPr/>
-      </p:nvGrpSpPr>
-      <p:grpSpPr/>
-      <p:sp>
-        <p:nvSpPr>
-          <p:cNvPr id="2" name="Title 1"/>
-          <p:cNvSpPr>
-            <a:spLocks noGrp="1"/>
-          </p:cNvSpPr>
-          <p:nvPr>
-            <p:ph type="title"/>
-          </p:nvPr>
-        </p:nvSpPr>
-        <p:spPr/>
-        <p:txBody>
-          <a:bodyPr/>
-          <a:lstStyle/>
-          <a:p/>
-        </p:txBody>
-      </p:sp>
-      <p:sp>
-        <p:nvSpPr>
-          <p:cNvPr id="4" name="Text Placeholder 3"/>
-          <p:cNvSpPr>
-            <a:spLocks noGrp="1"/>
-          </p:cNvSpPr>
-          <p:nvPr>
-            <p:ph type="body" idx="2" sz="half"/>
-          </p:nvPr>
-        </p:nvSpPr>
-        <p:spPr/>
-        <p:txBody>
-          <a:bodyPr/>
-          <a:lstStyle/>
-          <a:p/>
-        </p:txBody>
-      </p:sp>
-      <p:pic>
-        <p:nvPicPr>
-          <p:cNvPr id="5" name="Picture 4" descr="image.png"/>
-          <p:cNvPicPr>
-            <a:picLocks noChangeAspect="1"/>
-          </p:cNvPicPr>
-          <p:nvPr/>
-        </p:nvPicPr>
-        <p:blipFill>
-          <a:blip r:embed="rId2"/>
-          <a:stretch>
-            <a:fillRect/>
-          </a:stretch>
-        </p:blipFill>
-        <p:spPr>
-          <a:xfrm>
-            <a:off x="457200" y="685800"/>
-            <a:ext cx="8229600" cy="5486400"/>
-          </a:xfrm>
-          <a:prstGeom prst="rect">
-            <a:avLst/>
-          </a:prstGeom>
-        </p:spPr>
-      </p:pic>
-    </p:spTree>
-  </p:cSld>
-  <p:clrMapOvr>
-    <a:masterClrMapping/>
-  </p:clrMapOvr>
-</p:sld>
-</file>
-
-<file path=ppt/slides/slide22.xml><?xml version="1.0" encoding="utf-8"?>
-<p:sld xmlns:a="http://schemas.openxmlformats.org/drawingml/2006/main" xmlns:p="http://schemas.openxmlformats.org/presentationml/2006/main" xmlns:r="http://schemas.openxmlformats.org/officeDocument/2006/relationships">
-  <p:cSld>
-    <p:spTree>
-      <p:nvGrpSpPr>
-        <p:cNvPr id="1" name=""/>
-        <p:cNvGrpSpPr/>
-        <p:nvPr/>
-      </p:nvGrpSpPr>
-      <p:grpSpPr/>
-      <p:sp>
-        <p:nvSpPr>
-          <p:cNvPr id="2" name="Title 1"/>
-          <p:cNvSpPr>
-            <a:spLocks noGrp="1"/>
-          </p:cNvSpPr>
-          <p:nvPr>
-            <p:ph type="title"/>
-          </p:nvPr>
-        </p:nvSpPr>
-        <p:spPr/>
-        <p:txBody>
-          <a:bodyPr/>
-          <a:lstStyle/>
-          <a:p/>
-        </p:txBody>
-      </p:sp>
-      <p:sp>
-        <p:nvSpPr>
-          <p:cNvPr id="4" name="Text Placeholder 3"/>
-          <p:cNvSpPr>
-            <a:spLocks noGrp="1"/>
-          </p:cNvSpPr>
-          <p:nvPr>
-            <p:ph type="body" idx="2" sz="half"/>
-          </p:nvPr>
-        </p:nvSpPr>
-        <p:spPr/>
-        <p:txBody>
-          <a:bodyPr/>
-          <a:lstStyle/>
-          <a:p/>
-        </p:txBody>
-      </p:sp>
-      <p:pic>
-        <p:nvPicPr>
-          <p:cNvPr id="5" name="Picture 4" descr="image.png"/>
-          <p:cNvPicPr>
-            <a:picLocks noChangeAspect="1"/>
-          </p:cNvPicPr>
-          <p:nvPr/>
-        </p:nvPicPr>
-        <p:blipFill>
-          <a:blip r:embed="rId2"/>
-          <a:stretch>
-            <a:fillRect/>
-          </a:stretch>
-        </p:blipFill>
-        <p:spPr>
-          <a:xfrm>
-            <a:off x="457200" y="685800"/>
-            <a:ext cx="8229600" cy="5486400"/>
-          </a:xfrm>
-          <a:prstGeom prst="rect">
-            <a:avLst/>
-          </a:prstGeom>
-        </p:spPr>
-      </p:pic>
-    </p:spTree>
-  </p:cSld>
-  <p:clrMapOvr>
-    <a:masterClrMapping/>
-  </p:clrMapOvr>
-</p:sld>
-</file>
-
-<file path=ppt/slides/slide23.xml><?xml version="1.0" encoding="utf-8"?>
-<p:sld xmlns:a="http://schemas.openxmlformats.org/drawingml/2006/main" xmlns:p="http://schemas.openxmlformats.org/presentationml/2006/main" xmlns:r="http://schemas.openxmlformats.org/officeDocument/2006/relationships">
-  <p:cSld>
-    <p:spTree>
-      <p:nvGrpSpPr>
-        <p:cNvPr id="1" name=""/>
-        <p:cNvGrpSpPr/>
-        <p:nvPr/>
-      </p:nvGrpSpPr>
-      <p:grpSpPr/>
-      <p:sp>
-        <p:nvSpPr>
-          <p:cNvPr id="2" name="Title 1"/>
-          <p:cNvSpPr>
-            <a:spLocks noGrp="1"/>
-          </p:cNvSpPr>
-          <p:nvPr>
-            <p:ph type="title"/>
-          </p:nvPr>
-        </p:nvSpPr>
-        <p:spPr/>
-        <p:txBody>
-          <a:bodyPr/>
-          <a:lstStyle/>
-          <a:p/>
-        </p:txBody>
-      </p:sp>
-      <p:sp>
-        <p:nvSpPr>
-          <p:cNvPr id="4" name="Text Placeholder 3"/>
-          <p:cNvSpPr>
-            <a:spLocks noGrp="1"/>
-          </p:cNvSpPr>
-          <p:nvPr>
-            <p:ph type="body" idx="2" sz="half"/>
-          </p:nvPr>
-        </p:nvSpPr>
-        <p:spPr/>
-        <p:txBody>
-          <a:bodyPr/>
-          <a:lstStyle/>
-          <a:p/>
-        </p:txBody>
-      </p:sp>
-      <p:pic>
-        <p:nvPicPr>
-          <p:cNvPr id="5" name="Picture 4" descr="image.png"/>
-          <p:cNvPicPr>
-            <a:picLocks noChangeAspect="1"/>
-          </p:cNvPicPr>
-          <p:nvPr/>
-        </p:nvPicPr>
-        <p:blipFill>
-          <a:blip r:embed="rId2"/>
-          <a:stretch>
-            <a:fillRect/>
-          </a:stretch>
-        </p:blipFill>
-        <p:spPr>
-          <a:xfrm>
-            <a:off x="457200" y="685800"/>
-            <a:ext cx="8229600" cy="5486400"/>
-          </a:xfrm>
-          <a:prstGeom prst="rect">
-            <a:avLst/>
-          </a:prstGeom>
-        </p:spPr>
-      </p:pic>
-    </p:spTree>
-  </p:cSld>
-  <p:clrMapOvr>
-    <a:masterClrMapping/>
-  </p:clrMapOvr>
-</p:sld>
-</file>
-
-<file path=ppt/slides/slide24.xml><?xml version="1.0" encoding="utf-8"?>
-<p:sld xmlns:a="http://schemas.openxmlformats.org/drawingml/2006/main" xmlns:p="http://schemas.openxmlformats.org/presentationml/2006/main" xmlns:r="http://schemas.openxmlformats.org/officeDocument/2006/relationships">
-  <p:cSld>
-    <p:spTree>
-      <p:nvGrpSpPr>
-        <p:cNvPr id="1" name=""/>
-        <p:cNvGrpSpPr/>
-        <p:nvPr/>
-      </p:nvGrpSpPr>
-      <p:grpSpPr/>
-      <p:sp>
-        <p:nvSpPr>
-          <p:cNvPr id="2" name="Title 1"/>
-          <p:cNvSpPr>
-            <a:spLocks noGrp="1"/>
-          </p:cNvSpPr>
-          <p:nvPr>
-            <p:ph type="title"/>
-          </p:nvPr>
-        </p:nvSpPr>
-        <p:spPr/>
-        <p:txBody>
-          <a:bodyPr/>
-          <a:lstStyle/>
-          <a:p/>
-        </p:txBody>
-      </p:sp>
-      <p:sp>
-        <p:nvSpPr>
-          <p:cNvPr id="4" name="Text Placeholder 3"/>
-          <p:cNvSpPr>
-            <a:spLocks noGrp="1"/>
-          </p:cNvSpPr>
-          <p:nvPr>
-            <p:ph type="body" idx="2" sz="half"/>
-          </p:nvPr>
-        </p:nvSpPr>
-        <p:spPr/>
-        <p:txBody>
-          <a:bodyPr/>
-          <a:lstStyle/>
-          <a:p/>
-        </p:txBody>
-      </p:sp>
-      <p:pic>
-        <p:nvPicPr>
-          <p:cNvPr id="5" name="Picture 4" descr="image.png"/>
-          <p:cNvPicPr>
-            <a:picLocks noChangeAspect="1"/>
-          </p:cNvPicPr>
-          <p:nvPr/>
-        </p:nvPicPr>
-        <p:blipFill>
-          <a:blip r:embed="rId2"/>
-          <a:stretch>
-            <a:fillRect/>
-          </a:stretch>
-        </p:blipFill>
-        <p:spPr>
-          <a:xfrm>
-            <a:off x="457200" y="685800"/>
-            <a:ext cx="8229600" cy="5486400"/>
-          </a:xfrm>
-          <a:prstGeom prst="rect">
-            <a:avLst/>
-          </a:prstGeom>
-        </p:spPr>
-      </p:pic>
-    </p:spTree>
-  </p:cSld>
-  <p:clrMapOvr>
-    <a:masterClrMapping/>
-  </p:clrMapOvr>
-</p:sld>
-</file>
-
-<file path=ppt/slides/slide25.xml><?xml version="1.0" encoding="utf-8"?>
-<p:sld xmlns:a="http://schemas.openxmlformats.org/drawingml/2006/main" xmlns:p="http://schemas.openxmlformats.org/presentationml/2006/main" xmlns:r="http://schemas.openxmlformats.org/officeDocument/2006/relationships">
-  <p:cSld>
-    <p:spTree>
-      <p:nvGrpSpPr>
-        <p:cNvPr id="1" name=""/>
-        <p:cNvGrpSpPr/>
-        <p:nvPr/>
-      </p:nvGrpSpPr>
-      <p:grpSpPr/>
-      <p:sp>
-        <p:nvSpPr>
-          <p:cNvPr id="2" name="Title 1"/>
-          <p:cNvSpPr>
-            <a:spLocks noGrp="1"/>
-          </p:cNvSpPr>
-          <p:nvPr>
-            <p:ph type="title"/>
-          </p:nvPr>
-        </p:nvSpPr>
-        <p:spPr/>
-        <p:txBody>
-          <a:bodyPr/>
-          <a:lstStyle/>
-          <a:p/>
-        </p:txBody>
-      </p:sp>
-      <p:sp>
-        <p:nvSpPr>
-          <p:cNvPr id="4" name="Text Placeholder 3"/>
-          <p:cNvSpPr>
-            <a:spLocks noGrp="1"/>
-          </p:cNvSpPr>
-          <p:nvPr>
-            <p:ph type="body" idx="2" sz="half"/>
-          </p:nvPr>
-        </p:nvSpPr>
-        <p:spPr/>
-        <p:txBody>
-          <a:bodyPr/>
-          <a:lstStyle/>
-          <a:p/>
-        </p:txBody>
-      </p:sp>
-      <p:pic>
-        <p:nvPicPr>
-          <p:cNvPr id="5" name="Picture 4" descr="image.png"/>
-          <p:cNvPicPr>
-            <a:picLocks noChangeAspect="1"/>
-          </p:cNvPicPr>
-          <p:nvPr/>
-        </p:nvPicPr>
-        <p:blipFill>
-          <a:blip r:embed="rId2"/>
-          <a:stretch>
-            <a:fillRect/>
-          </a:stretch>
-        </p:blipFill>
-        <p:spPr>
-          <a:xfrm>
-            <a:off x="457200" y="685800"/>
-            <a:ext cx="8229600" cy="5486400"/>
-          </a:xfrm>
-          <a:prstGeom prst="rect">
-            <a:avLst/>
-          </a:prstGeom>
-        </p:spPr>
-      </p:pic>
-    </p:spTree>
-  </p:cSld>
-  <p:clrMapOvr>
-    <a:masterClrMapping/>
-  </p:clrMapOvr>
-</p:sld>
-</file>
-
-<file path=ppt/slides/slide26.xml><?xml version="1.0" encoding="utf-8"?>
-<p:sld xmlns:a="http://schemas.openxmlformats.org/drawingml/2006/main" xmlns:p="http://schemas.openxmlformats.org/presentationml/2006/main" xmlns:r="http://schemas.openxmlformats.org/officeDocument/2006/relationships">
-  <p:cSld>
-    <p:spTree>
-      <p:nvGrpSpPr>
-        <p:cNvPr id="1" name=""/>
-        <p:cNvGrpSpPr/>
-        <p:nvPr/>
-      </p:nvGrpSpPr>
-      <p:grpSpPr/>
-      <p:sp>
-        <p:nvSpPr>
-          <p:cNvPr id="2" name="Title 1"/>
-          <p:cNvSpPr>
-            <a:spLocks noGrp="1"/>
-          </p:cNvSpPr>
-          <p:nvPr>
-            <p:ph type="title"/>
-          </p:nvPr>
-        </p:nvSpPr>
-        <p:spPr/>
-        <p:txBody>
-          <a:bodyPr/>
-          <a:lstStyle/>
-          <a:p/>
-        </p:txBody>
-      </p:sp>
-      <p:sp>
-        <p:nvSpPr>
-          <p:cNvPr id="4" name="Text Placeholder 3"/>
-          <p:cNvSpPr>
-            <a:spLocks noGrp="1"/>
-          </p:cNvSpPr>
-          <p:nvPr>
-            <p:ph type="body" idx="2" sz="half"/>
-          </p:nvPr>
-        </p:nvSpPr>
-        <p:spPr/>
-        <p:txBody>
-          <a:bodyPr/>
-          <a:lstStyle/>
-          <a:p/>
-        </p:txBody>
-      </p:sp>
-      <p:pic>
-        <p:nvPicPr>
-          <p:cNvPr id="5" name="Picture 4" descr="image.png"/>
-          <p:cNvPicPr>
-            <a:picLocks noChangeAspect="1"/>
-          </p:cNvPicPr>
-          <p:nvPr/>
-        </p:nvPicPr>
-        <p:blipFill>
-          <a:blip r:embed="rId2"/>
-          <a:stretch>
-            <a:fillRect/>
-          </a:stretch>
-        </p:blipFill>
-        <p:spPr>
-          <a:xfrm>
-            <a:off x="457200" y="685800"/>
-            <a:ext cx="8229600" cy="5486400"/>
-          </a:xfrm>
-          <a:prstGeom prst="rect">
-            <a:avLst/>
-          </a:prstGeom>
-        </p:spPr>
-      </p:pic>
-    </p:spTree>
-  </p:cSld>
-  <p:clrMapOvr>
-    <a:masterClrMapping/>
-  </p:clrMapOvr>
-</p:sld>
-</file>
-
-<file path=ppt/slides/slide27.xml><?xml version="1.0" encoding="utf-8"?>
-<p:sld xmlns:a="http://schemas.openxmlformats.org/drawingml/2006/main" xmlns:p="http://schemas.openxmlformats.org/presentationml/2006/main" xmlns:r="http://schemas.openxmlformats.org/officeDocument/2006/relationships">
-  <p:cSld>
-    <p:spTree>
-      <p:nvGrpSpPr>
-        <p:cNvPr id="1" name=""/>
-        <p:cNvGrpSpPr/>
-        <p:nvPr/>
-      </p:nvGrpSpPr>
-      <p:grpSpPr/>
-      <p:sp>
-        <p:nvSpPr>
-          <p:cNvPr id="2" name="Title 1"/>
-          <p:cNvSpPr>
-            <a:spLocks noGrp="1"/>
-          </p:cNvSpPr>
-          <p:nvPr>
-            <p:ph type="title"/>
-          </p:nvPr>
-        </p:nvSpPr>
-        <p:spPr/>
-        <p:txBody>
-          <a:bodyPr/>
-          <a:lstStyle/>
-          <a:p/>
-        </p:txBody>
-      </p:sp>
-      <p:sp>
-        <p:nvSpPr>
-          <p:cNvPr id="4" name="Text Placeholder 3"/>
-          <p:cNvSpPr>
-            <a:spLocks noGrp="1"/>
-          </p:cNvSpPr>
-          <p:nvPr>
-            <p:ph type="body" idx="2" sz="half"/>
-          </p:nvPr>
-        </p:nvSpPr>
-        <p:spPr/>
-        <p:txBody>
-          <a:bodyPr/>
-          <a:lstStyle/>
-          <a:p/>
-        </p:txBody>
-      </p:sp>
-      <p:pic>
-        <p:nvPicPr>
-          <p:cNvPr id="5" name="Picture 4" descr="image.png"/>
-          <p:cNvPicPr>
-            <a:picLocks noChangeAspect="1"/>
-          </p:cNvPicPr>
-          <p:nvPr/>
-        </p:nvPicPr>
-        <p:blipFill>
-          <a:blip r:embed="rId2"/>
-          <a:stretch>
-            <a:fillRect/>
-          </a:stretch>
-        </p:blipFill>
-        <p:spPr>
-          <a:xfrm>
-            <a:off x="457200" y="685800"/>
-            <a:ext cx="8229600" cy="5486400"/>
-          </a:xfrm>
-          <a:prstGeom prst="rect">
-            <a:avLst/>
-          </a:prstGeom>
-        </p:spPr>
-      </p:pic>
-    </p:spTree>
-  </p:cSld>
-  <p:clrMapOvr>
-    <a:masterClrMapping/>
-  </p:clrMapOvr>
-</p:sld>
-</file>
-
-<file path=ppt/slides/slide28.xml><?xml version="1.0" encoding="utf-8"?>
-<p:sld xmlns:a="http://schemas.openxmlformats.org/drawingml/2006/main" xmlns:p="http://schemas.openxmlformats.org/presentationml/2006/main" xmlns:r="http://schemas.openxmlformats.org/officeDocument/2006/relationships">
-  <p:cSld>
-    <p:spTree>
-      <p:nvGrpSpPr>
-        <p:cNvPr id="1" name=""/>
-        <p:cNvGrpSpPr/>
-        <p:nvPr/>
-      </p:nvGrpSpPr>
-      <p:grpSpPr/>
-      <p:sp>
-        <p:nvSpPr>
-          <p:cNvPr id="2" name="Title 1"/>
-          <p:cNvSpPr>
-            <a:spLocks noGrp="1"/>
-          </p:cNvSpPr>
-          <p:nvPr>
-            <p:ph type="title"/>
-          </p:nvPr>
-        </p:nvSpPr>
-        <p:spPr/>
-        <p:txBody>
-          <a:bodyPr/>
-          <a:lstStyle/>
-          <a:p/>
-        </p:txBody>
-      </p:sp>
-      <p:sp>
-        <p:nvSpPr>
-          <p:cNvPr id="4" name="Text Placeholder 3"/>
-          <p:cNvSpPr>
-            <a:spLocks noGrp="1"/>
-          </p:cNvSpPr>
-          <p:nvPr>
-            <p:ph type="body" idx="2" sz="half"/>
-          </p:nvPr>
-        </p:nvSpPr>
-        <p:spPr/>
-        <p:txBody>
-          <a:bodyPr/>
-          <a:lstStyle/>
-          <a:p/>
-        </p:txBody>
-      </p:sp>
-      <p:pic>
-        <p:nvPicPr>
-          <p:cNvPr id="5" name="Picture 4" descr="image.png"/>
-          <p:cNvPicPr>
-            <a:picLocks noChangeAspect="1"/>
-          </p:cNvPicPr>
-          <p:nvPr/>
-        </p:nvPicPr>
-        <p:blipFill>
-          <a:blip r:embed="rId2"/>
-          <a:stretch>
-            <a:fillRect/>
-          </a:stretch>
-        </p:blipFill>
-        <p:spPr>
-          <a:xfrm>
-            <a:off x="457200" y="685800"/>
-            <a:ext cx="8229600" cy="5486400"/>
-          </a:xfrm>
-          <a:prstGeom prst="rect">
-            <a:avLst/>
-          </a:prstGeom>
-        </p:spPr>
-      </p:pic>
-    </p:spTree>
-  </p:cSld>
-  <p:clrMapOvr>
-    <a:masterClrMapping/>
-  </p:clrMapOvr>
-</p:sld>
-</file>
-
-<file path=ppt/slides/slide29.xml><?xml version="1.0" encoding="utf-8"?>
-<p:sld xmlns:a="http://schemas.openxmlformats.org/drawingml/2006/main" xmlns:p="http://schemas.openxmlformats.org/presentationml/2006/main" xmlns:r="http://schemas.openxmlformats.org/officeDocument/2006/relationships">
-  <p:cSld>
-    <p:spTree>
-      <p:nvGrpSpPr>
-        <p:cNvPr id="1" name=""/>
-        <p:cNvGrpSpPr/>
-        <p:nvPr/>
-      </p:nvGrpSpPr>
-      <p:grpSpPr/>
-      <p:sp>
-        <p:nvSpPr>
-          <p:cNvPr id="2" name="Title 1"/>
-          <p:cNvSpPr>
-            <a:spLocks noGrp="1"/>
-          </p:cNvSpPr>
-          <p:nvPr>
-            <p:ph type="title"/>
-          </p:nvPr>
-        </p:nvSpPr>
-        <p:spPr/>
-        <p:txBody>
-          <a:bodyPr/>
-          <a:lstStyle/>
-          <a:p/>
-        </p:txBody>
-      </p:sp>
-      <p:sp>
-        <p:nvSpPr>
-          <p:cNvPr id="4" name="Text Placeholder 3"/>
-          <p:cNvSpPr>
-            <a:spLocks noGrp="1"/>
-          </p:cNvSpPr>
-          <p:nvPr>
-            <p:ph type="body" idx="2" sz="half"/>
-          </p:nvPr>
-        </p:nvSpPr>
-        <p:spPr/>
-        <p:txBody>
-          <a:bodyPr/>
-          <a:lstStyle/>
-          <a:p/>
-        </p:txBody>
-      </p:sp>
-      <p:pic>
-        <p:nvPicPr>
-          <p:cNvPr id="5" name="Picture 4" descr="image.png"/>
-          <p:cNvPicPr>
-            <a:picLocks noChangeAspect="1"/>
-          </p:cNvPicPr>
-          <p:nvPr/>
-        </p:nvPicPr>
-        <p:blipFill>
-          <a:blip r:embed="rId2"/>
-          <a:stretch>
-            <a:fillRect/>
-          </a:stretch>
-        </p:blipFill>
-        <p:spPr>
-          <a:xfrm>
-            <a:off x="457200" y="685800"/>
-            <a:ext cx="8229600" cy="5486400"/>
-          </a:xfrm>
-          <a:prstGeom prst="rect">
-            <a:avLst/>
-          </a:prstGeom>
-        </p:spPr>
-      </p:pic>
     </p:spTree>
   </p:cSld>
   <p:clrMapOvr>
@@ -4958,462 +3409,6 @@
           </a:p>
         </p:txBody>
       </p:sp>
-    </p:spTree>
-  </p:cSld>
-  <p:clrMapOvr>
-    <a:masterClrMapping/>
-  </p:clrMapOvr>
-</p:sld>
-</file>
-
-<file path=ppt/slides/slide30.xml><?xml version="1.0" encoding="utf-8"?>
-<p:sld xmlns:a="http://schemas.openxmlformats.org/drawingml/2006/main" xmlns:p="http://schemas.openxmlformats.org/presentationml/2006/main" xmlns:r="http://schemas.openxmlformats.org/officeDocument/2006/relationships">
-  <p:cSld>
-    <p:spTree>
-      <p:nvGrpSpPr>
-        <p:cNvPr id="1" name=""/>
-        <p:cNvGrpSpPr/>
-        <p:nvPr/>
-      </p:nvGrpSpPr>
-      <p:grpSpPr/>
-      <p:sp>
-        <p:nvSpPr>
-          <p:cNvPr id="2" name="Title 1"/>
-          <p:cNvSpPr>
-            <a:spLocks noGrp="1"/>
-          </p:cNvSpPr>
-          <p:nvPr>
-            <p:ph type="title"/>
-          </p:nvPr>
-        </p:nvSpPr>
-        <p:spPr/>
-        <p:txBody>
-          <a:bodyPr/>
-          <a:lstStyle/>
-          <a:p/>
-        </p:txBody>
-      </p:sp>
-      <p:sp>
-        <p:nvSpPr>
-          <p:cNvPr id="4" name="Text Placeholder 3"/>
-          <p:cNvSpPr>
-            <a:spLocks noGrp="1"/>
-          </p:cNvSpPr>
-          <p:nvPr>
-            <p:ph type="body" idx="2" sz="half"/>
-          </p:nvPr>
-        </p:nvSpPr>
-        <p:spPr/>
-        <p:txBody>
-          <a:bodyPr/>
-          <a:lstStyle/>
-          <a:p/>
-        </p:txBody>
-      </p:sp>
-      <p:pic>
-        <p:nvPicPr>
-          <p:cNvPr id="5" name="Picture 4" descr="image.png"/>
-          <p:cNvPicPr>
-            <a:picLocks noChangeAspect="1"/>
-          </p:cNvPicPr>
-          <p:nvPr/>
-        </p:nvPicPr>
-        <p:blipFill>
-          <a:blip r:embed="rId2"/>
-          <a:stretch>
-            <a:fillRect/>
-          </a:stretch>
-        </p:blipFill>
-        <p:spPr>
-          <a:xfrm>
-            <a:off x="457200" y="685800"/>
-            <a:ext cx="8229600" cy="5486400"/>
-          </a:xfrm>
-          <a:prstGeom prst="rect">
-            <a:avLst/>
-          </a:prstGeom>
-        </p:spPr>
-      </p:pic>
-    </p:spTree>
-  </p:cSld>
-  <p:clrMapOvr>
-    <a:masterClrMapping/>
-  </p:clrMapOvr>
-</p:sld>
-</file>
-
-<file path=ppt/slides/slide31.xml><?xml version="1.0" encoding="utf-8"?>
-<p:sld xmlns:a="http://schemas.openxmlformats.org/drawingml/2006/main" xmlns:p="http://schemas.openxmlformats.org/presentationml/2006/main" xmlns:r="http://schemas.openxmlformats.org/officeDocument/2006/relationships">
-  <p:cSld>
-    <p:spTree>
-      <p:nvGrpSpPr>
-        <p:cNvPr id="1" name=""/>
-        <p:cNvGrpSpPr/>
-        <p:nvPr/>
-      </p:nvGrpSpPr>
-      <p:grpSpPr/>
-      <p:sp>
-        <p:nvSpPr>
-          <p:cNvPr id="2" name="Title 1"/>
-          <p:cNvSpPr>
-            <a:spLocks noGrp="1"/>
-          </p:cNvSpPr>
-          <p:nvPr>
-            <p:ph type="title"/>
-          </p:nvPr>
-        </p:nvSpPr>
-        <p:spPr/>
-        <p:txBody>
-          <a:bodyPr/>
-          <a:lstStyle/>
-          <a:p/>
-        </p:txBody>
-      </p:sp>
-      <p:sp>
-        <p:nvSpPr>
-          <p:cNvPr id="4" name="Text Placeholder 3"/>
-          <p:cNvSpPr>
-            <a:spLocks noGrp="1"/>
-          </p:cNvSpPr>
-          <p:nvPr>
-            <p:ph type="body" idx="2" sz="half"/>
-          </p:nvPr>
-        </p:nvSpPr>
-        <p:spPr/>
-        <p:txBody>
-          <a:bodyPr/>
-          <a:lstStyle/>
-          <a:p/>
-        </p:txBody>
-      </p:sp>
-      <p:pic>
-        <p:nvPicPr>
-          <p:cNvPr id="5" name="Picture 4" descr="image.png"/>
-          <p:cNvPicPr>
-            <a:picLocks noChangeAspect="1"/>
-          </p:cNvPicPr>
-          <p:nvPr/>
-        </p:nvPicPr>
-        <p:blipFill>
-          <a:blip r:embed="rId2"/>
-          <a:stretch>
-            <a:fillRect/>
-          </a:stretch>
-        </p:blipFill>
-        <p:spPr>
-          <a:xfrm>
-            <a:off x="457200" y="685800"/>
-            <a:ext cx="8229600" cy="5486400"/>
-          </a:xfrm>
-          <a:prstGeom prst="rect">
-            <a:avLst/>
-          </a:prstGeom>
-        </p:spPr>
-      </p:pic>
-    </p:spTree>
-  </p:cSld>
-  <p:clrMapOvr>
-    <a:masterClrMapping/>
-  </p:clrMapOvr>
-</p:sld>
-</file>
-
-<file path=ppt/slides/slide32.xml><?xml version="1.0" encoding="utf-8"?>
-<p:sld xmlns:a="http://schemas.openxmlformats.org/drawingml/2006/main" xmlns:p="http://schemas.openxmlformats.org/presentationml/2006/main" xmlns:r="http://schemas.openxmlformats.org/officeDocument/2006/relationships">
-  <p:cSld>
-    <p:spTree>
-      <p:nvGrpSpPr>
-        <p:cNvPr id="1" name=""/>
-        <p:cNvGrpSpPr/>
-        <p:nvPr/>
-      </p:nvGrpSpPr>
-      <p:grpSpPr/>
-      <p:sp>
-        <p:nvSpPr>
-          <p:cNvPr id="2" name="Title 1"/>
-          <p:cNvSpPr>
-            <a:spLocks noGrp="1"/>
-          </p:cNvSpPr>
-          <p:nvPr>
-            <p:ph type="title"/>
-          </p:nvPr>
-        </p:nvSpPr>
-        <p:spPr/>
-        <p:txBody>
-          <a:bodyPr/>
-          <a:lstStyle/>
-          <a:p/>
-        </p:txBody>
-      </p:sp>
-      <p:sp>
-        <p:nvSpPr>
-          <p:cNvPr id="4" name="Text Placeholder 3"/>
-          <p:cNvSpPr>
-            <a:spLocks noGrp="1"/>
-          </p:cNvSpPr>
-          <p:nvPr>
-            <p:ph type="body" idx="2" sz="half"/>
-          </p:nvPr>
-        </p:nvSpPr>
-        <p:spPr/>
-        <p:txBody>
-          <a:bodyPr/>
-          <a:lstStyle/>
-          <a:p/>
-        </p:txBody>
-      </p:sp>
-      <p:pic>
-        <p:nvPicPr>
-          <p:cNvPr id="5" name="Picture 4" descr="image.png"/>
-          <p:cNvPicPr>
-            <a:picLocks noChangeAspect="1"/>
-          </p:cNvPicPr>
-          <p:nvPr/>
-        </p:nvPicPr>
-        <p:blipFill>
-          <a:blip r:embed="rId2"/>
-          <a:stretch>
-            <a:fillRect/>
-          </a:stretch>
-        </p:blipFill>
-        <p:spPr>
-          <a:xfrm>
-            <a:off x="457200" y="685800"/>
-            <a:ext cx="8229600" cy="5486400"/>
-          </a:xfrm>
-          <a:prstGeom prst="rect">
-            <a:avLst/>
-          </a:prstGeom>
-        </p:spPr>
-      </p:pic>
-    </p:spTree>
-  </p:cSld>
-  <p:clrMapOvr>
-    <a:masterClrMapping/>
-  </p:clrMapOvr>
-</p:sld>
-</file>
-
-<file path=ppt/slides/slide33.xml><?xml version="1.0" encoding="utf-8"?>
-<p:sld xmlns:a="http://schemas.openxmlformats.org/drawingml/2006/main" xmlns:p="http://schemas.openxmlformats.org/presentationml/2006/main" xmlns:r="http://schemas.openxmlformats.org/officeDocument/2006/relationships">
-  <p:cSld>
-    <p:spTree>
-      <p:nvGrpSpPr>
-        <p:cNvPr id="1" name=""/>
-        <p:cNvGrpSpPr/>
-        <p:nvPr/>
-      </p:nvGrpSpPr>
-      <p:grpSpPr/>
-      <p:sp>
-        <p:nvSpPr>
-          <p:cNvPr id="2" name="Title 1"/>
-          <p:cNvSpPr>
-            <a:spLocks noGrp="1"/>
-          </p:cNvSpPr>
-          <p:nvPr>
-            <p:ph type="title"/>
-          </p:nvPr>
-        </p:nvSpPr>
-        <p:spPr/>
-        <p:txBody>
-          <a:bodyPr/>
-          <a:lstStyle/>
-          <a:p/>
-        </p:txBody>
-      </p:sp>
-      <p:sp>
-        <p:nvSpPr>
-          <p:cNvPr id="4" name="Text Placeholder 3"/>
-          <p:cNvSpPr>
-            <a:spLocks noGrp="1"/>
-          </p:cNvSpPr>
-          <p:nvPr>
-            <p:ph type="body" idx="2" sz="half"/>
-          </p:nvPr>
-        </p:nvSpPr>
-        <p:spPr/>
-        <p:txBody>
-          <a:bodyPr/>
-          <a:lstStyle/>
-          <a:p/>
-        </p:txBody>
-      </p:sp>
-      <p:pic>
-        <p:nvPicPr>
-          <p:cNvPr id="5" name="Picture 4" descr="image.png"/>
-          <p:cNvPicPr>
-            <a:picLocks noChangeAspect="1"/>
-          </p:cNvPicPr>
-          <p:nvPr/>
-        </p:nvPicPr>
-        <p:blipFill>
-          <a:blip r:embed="rId2"/>
-          <a:stretch>
-            <a:fillRect/>
-          </a:stretch>
-        </p:blipFill>
-        <p:spPr>
-          <a:xfrm>
-            <a:off x="457200" y="685800"/>
-            <a:ext cx="8229600" cy="5486400"/>
-          </a:xfrm>
-          <a:prstGeom prst="rect">
-            <a:avLst/>
-          </a:prstGeom>
-        </p:spPr>
-      </p:pic>
-    </p:spTree>
-  </p:cSld>
-  <p:clrMapOvr>
-    <a:masterClrMapping/>
-  </p:clrMapOvr>
-</p:sld>
-</file>
-
-<file path=ppt/slides/slide34.xml><?xml version="1.0" encoding="utf-8"?>
-<p:sld xmlns:a="http://schemas.openxmlformats.org/drawingml/2006/main" xmlns:p="http://schemas.openxmlformats.org/presentationml/2006/main" xmlns:r="http://schemas.openxmlformats.org/officeDocument/2006/relationships">
-  <p:cSld>
-    <p:spTree>
-      <p:nvGrpSpPr>
-        <p:cNvPr id="1" name=""/>
-        <p:cNvGrpSpPr/>
-        <p:nvPr/>
-      </p:nvGrpSpPr>
-      <p:grpSpPr/>
-      <p:sp>
-        <p:nvSpPr>
-          <p:cNvPr id="2" name="Title 1"/>
-          <p:cNvSpPr>
-            <a:spLocks noGrp="1"/>
-          </p:cNvSpPr>
-          <p:nvPr>
-            <p:ph type="title"/>
-          </p:nvPr>
-        </p:nvSpPr>
-        <p:spPr/>
-        <p:txBody>
-          <a:bodyPr/>
-          <a:lstStyle/>
-          <a:p/>
-        </p:txBody>
-      </p:sp>
-      <p:sp>
-        <p:nvSpPr>
-          <p:cNvPr id="4" name="Text Placeholder 3"/>
-          <p:cNvSpPr>
-            <a:spLocks noGrp="1"/>
-          </p:cNvSpPr>
-          <p:nvPr>
-            <p:ph type="body" idx="2" sz="half"/>
-          </p:nvPr>
-        </p:nvSpPr>
-        <p:spPr/>
-        <p:txBody>
-          <a:bodyPr/>
-          <a:lstStyle/>
-          <a:p/>
-        </p:txBody>
-      </p:sp>
-      <p:pic>
-        <p:nvPicPr>
-          <p:cNvPr id="5" name="Picture 4" descr="image.png"/>
-          <p:cNvPicPr>
-            <a:picLocks noChangeAspect="1"/>
-          </p:cNvPicPr>
-          <p:nvPr/>
-        </p:nvPicPr>
-        <p:blipFill>
-          <a:blip r:embed="rId2"/>
-          <a:stretch>
-            <a:fillRect/>
-          </a:stretch>
-        </p:blipFill>
-        <p:spPr>
-          <a:xfrm>
-            <a:off x="457200" y="896815"/>
-            <a:ext cx="8229600" cy="5064369"/>
-          </a:xfrm>
-          <a:prstGeom prst="rect">
-            <a:avLst/>
-          </a:prstGeom>
-        </p:spPr>
-      </p:pic>
-    </p:spTree>
-  </p:cSld>
-  <p:clrMapOvr>
-    <a:masterClrMapping/>
-  </p:clrMapOvr>
-</p:sld>
-</file>
-
-<file path=ppt/slides/slide35.xml><?xml version="1.0" encoding="utf-8"?>
-<p:sld xmlns:a="http://schemas.openxmlformats.org/drawingml/2006/main" xmlns:p="http://schemas.openxmlformats.org/presentationml/2006/main" xmlns:r="http://schemas.openxmlformats.org/officeDocument/2006/relationships">
-  <p:cSld>
-    <p:spTree>
-      <p:nvGrpSpPr>
-        <p:cNvPr id="1" name=""/>
-        <p:cNvGrpSpPr/>
-        <p:nvPr/>
-      </p:nvGrpSpPr>
-      <p:grpSpPr/>
-      <p:sp>
-        <p:nvSpPr>
-          <p:cNvPr id="2" name="Title 1"/>
-          <p:cNvSpPr>
-            <a:spLocks noGrp="1"/>
-          </p:cNvSpPr>
-          <p:nvPr>
-            <p:ph type="title"/>
-          </p:nvPr>
-        </p:nvSpPr>
-        <p:spPr/>
-        <p:txBody>
-          <a:bodyPr/>
-          <a:lstStyle/>
-          <a:p/>
-        </p:txBody>
-      </p:sp>
-      <p:sp>
-        <p:nvSpPr>
-          <p:cNvPr id="4" name="Text Placeholder 3"/>
-          <p:cNvSpPr>
-            <a:spLocks noGrp="1"/>
-          </p:cNvSpPr>
-          <p:nvPr>
-            <p:ph type="body" idx="2" sz="half"/>
-          </p:nvPr>
-        </p:nvSpPr>
-        <p:spPr/>
-        <p:txBody>
-          <a:bodyPr/>
-          <a:lstStyle/>
-          <a:p/>
-        </p:txBody>
-      </p:sp>
-      <p:pic>
-        <p:nvPicPr>
-          <p:cNvPr id="5" name="Picture 4" descr="image.png"/>
-          <p:cNvPicPr>
-            <a:picLocks noChangeAspect="1"/>
-          </p:cNvPicPr>
-          <p:nvPr/>
-        </p:nvPicPr>
-        <p:blipFill>
-          <a:blip r:embed="rId2"/>
-          <a:stretch>
-            <a:fillRect/>
-          </a:stretch>
-        </p:blipFill>
-        <p:spPr>
-          <a:xfrm>
-            <a:off x="457200" y="685800"/>
-            <a:ext cx="8229600" cy="5486400"/>
-          </a:xfrm>
-          <a:prstGeom prst="rect">
-            <a:avLst/>
-          </a:prstGeom>
-        </p:spPr>
-      </p:pic>
     </p:spTree>
   </p:cSld>
   <p:clrMapOvr>
@@ -5636,234 +3631,6 @@
           <a:xfrm>
             <a:off x="1371600" y="228600"/>
             <a:ext cx="6400800" cy="6400800"/>
-          </a:xfrm>
-          <a:prstGeom prst="rect">
-            <a:avLst/>
-          </a:prstGeom>
-        </p:spPr>
-      </p:pic>
-    </p:spTree>
-  </p:cSld>
-  <p:clrMapOvr>
-    <a:masterClrMapping/>
-  </p:clrMapOvr>
-</p:sld>
-</file>
-
-<file path=ppt/slides/slide7.xml><?xml version="1.0" encoding="utf-8"?>
-<p:sld xmlns:a="http://schemas.openxmlformats.org/drawingml/2006/main" xmlns:p="http://schemas.openxmlformats.org/presentationml/2006/main" xmlns:r="http://schemas.openxmlformats.org/officeDocument/2006/relationships">
-  <p:cSld>
-    <p:spTree>
-      <p:nvGrpSpPr>
-        <p:cNvPr id="1" name=""/>
-        <p:cNvGrpSpPr/>
-        <p:nvPr/>
-      </p:nvGrpSpPr>
-      <p:grpSpPr/>
-      <p:sp>
-        <p:nvSpPr>
-          <p:cNvPr id="2" name="Title 1"/>
-          <p:cNvSpPr>
-            <a:spLocks noGrp="1"/>
-          </p:cNvSpPr>
-          <p:nvPr>
-            <p:ph type="title"/>
-          </p:nvPr>
-        </p:nvSpPr>
-        <p:spPr/>
-        <p:txBody>
-          <a:bodyPr/>
-          <a:lstStyle/>
-          <a:p/>
-        </p:txBody>
-      </p:sp>
-      <p:sp>
-        <p:nvSpPr>
-          <p:cNvPr id="4" name="Text Placeholder 3"/>
-          <p:cNvSpPr>
-            <a:spLocks noGrp="1"/>
-          </p:cNvSpPr>
-          <p:nvPr>
-            <p:ph type="body" idx="2" sz="half"/>
-          </p:nvPr>
-        </p:nvSpPr>
-        <p:spPr/>
-        <p:txBody>
-          <a:bodyPr/>
-          <a:lstStyle/>
-          <a:p/>
-        </p:txBody>
-      </p:sp>
-      <p:pic>
-        <p:nvPicPr>
-          <p:cNvPr id="5" name="Picture 4" descr="image.png"/>
-          <p:cNvPicPr>
-            <a:picLocks noChangeAspect="1"/>
-          </p:cNvPicPr>
-          <p:nvPr/>
-        </p:nvPicPr>
-        <p:blipFill>
-          <a:blip r:embed="rId2"/>
-          <a:stretch>
-            <a:fillRect/>
-          </a:stretch>
-        </p:blipFill>
-        <p:spPr>
-          <a:xfrm>
-            <a:off x="457200" y="685800"/>
-            <a:ext cx="8229600" cy="5486400"/>
-          </a:xfrm>
-          <a:prstGeom prst="rect">
-            <a:avLst/>
-          </a:prstGeom>
-        </p:spPr>
-      </p:pic>
-    </p:spTree>
-  </p:cSld>
-  <p:clrMapOvr>
-    <a:masterClrMapping/>
-  </p:clrMapOvr>
-</p:sld>
-</file>
-
-<file path=ppt/slides/slide8.xml><?xml version="1.0" encoding="utf-8"?>
-<p:sld xmlns:a="http://schemas.openxmlformats.org/drawingml/2006/main" xmlns:p="http://schemas.openxmlformats.org/presentationml/2006/main" xmlns:r="http://schemas.openxmlformats.org/officeDocument/2006/relationships">
-  <p:cSld>
-    <p:spTree>
-      <p:nvGrpSpPr>
-        <p:cNvPr id="1" name=""/>
-        <p:cNvGrpSpPr/>
-        <p:nvPr/>
-      </p:nvGrpSpPr>
-      <p:grpSpPr/>
-      <p:sp>
-        <p:nvSpPr>
-          <p:cNvPr id="2" name="Title 1"/>
-          <p:cNvSpPr>
-            <a:spLocks noGrp="1"/>
-          </p:cNvSpPr>
-          <p:nvPr>
-            <p:ph type="title"/>
-          </p:nvPr>
-        </p:nvSpPr>
-        <p:spPr/>
-        <p:txBody>
-          <a:bodyPr/>
-          <a:lstStyle/>
-          <a:p/>
-        </p:txBody>
-      </p:sp>
-      <p:sp>
-        <p:nvSpPr>
-          <p:cNvPr id="4" name="Text Placeholder 3"/>
-          <p:cNvSpPr>
-            <a:spLocks noGrp="1"/>
-          </p:cNvSpPr>
-          <p:nvPr>
-            <p:ph type="body" idx="2" sz="half"/>
-          </p:nvPr>
-        </p:nvSpPr>
-        <p:spPr/>
-        <p:txBody>
-          <a:bodyPr/>
-          <a:lstStyle/>
-          <a:p/>
-        </p:txBody>
-      </p:sp>
-      <p:pic>
-        <p:nvPicPr>
-          <p:cNvPr id="5" name="Picture 4" descr="image.png"/>
-          <p:cNvPicPr>
-            <a:picLocks noChangeAspect="1"/>
-          </p:cNvPicPr>
-          <p:nvPr/>
-        </p:nvPicPr>
-        <p:blipFill>
-          <a:blip r:embed="rId2"/>
-          <a:stretch>
-            <a:fillRect/>
-          </a:stretch>
-        </p:blipFill>
-        <p:spPr>
-          <a:xfrm>
-            <a:off x="457200" y="1600200"/>
-            <a:ext cx="8229600" cy="3657600"/>
-          </a:xfrm>
-          <a:prstGeom prst="rect">
-            <a:avLst/>
-          </a:prstGeom>
-        </p:spPr>
-      </p:pic>
-    </p:spTree>
-  </p:cSld>
-  <p:clrMapOvr>
-    <a:masterClrMapping/>
-  </p:clrMapOvr>
-</p:sld>
-</file>
-
-<file path=ppt/slides/slide9.xml><?xml version="1.0" encoding="utf-8"?>
-<p:sld xmlns:a="http://schemas.openxmlformats.org/drawingml/2006/main" xmlns:p="http://schemas.openxmlformats.org/presentationml/2006/main" xmlns:r="http://schemas.openxmlformats.org/officeDocument/2006/relationships">
-  <p:cSld>
-    <p:spTree>
-      <p:nvGrpSpPr>
-        <p:cNvPr id="1" name=""/>
-        <p:cNvGrpSpPr/>
-        <p:nvPr/>
-      </p:nvGrpSpPr>
-      <p:grpSpPr/>
-      <p:sp>
-        <p:nvSpPr>
-          <p:cNvPr id="2" name="Title 1"/>
-          <p:cNvSpPr>
-            <a:spLocks noGrp="1"/>
-          </p:cNvSpPr>
-          <p:nvPr>
-            <p:ph type="title"/>
-          </p:nvPr>
-        </p:nvSpPr>
-        <p:spPr/>
-        <p:txBody>
-          <a:bodyPr/>
-          <a:lstStyle/>
-          <a:p/>
-        </p:txBody>
-      </p:sp>
-      <p:sp>
-        <p:nvSpPr>
-          <p:cNvPr id="4" name="Text Placeholder 3"/>
-          <p:cNvSpPr>
-            <a:spLocks noGrp="1"/>
-          </p:cNvSpPr>
-          <p:nvPr>
-            <p:ph type="body" idx="2" sz="half"/>
-          </p:nvPr>
-        </p:nvSpPr>
-        <p:spPr/>
-        <p:txBody>
-          <a:bodyPr/>
-          <a:lstStyle/>
-          <a:p/>
-        </p:txBody>
-      </p:sp>
-      <p:pic>
-        <p:nvPicPr>
-          <p:cNvPr id="5" name="Picture 4" descr="image.png"/>
-          <p:cNvPicPr>
-            <a:picLocks noChangeAspect="1"/>
-          </p:cNvPicPr>
-          <p:nvPr/>
-        </p:nvPicPr>
-        <p:blipFill>
-          <a:blip r:embed="rId2"/>
-          <a:stretch>
-            <a:fillRect/>
-          </a:stretch>
-        </p:blipFill>
-        <p:spPr>
-          <a:xfrm>
-            <a:off x="457200" y="1600200"/>
-            <a:ext cx="8229600" cy="3657600"/>
           </a:xfrm>
           <a:prstGeom prst="rect">
             <a:avLst/>

</xml_diff>